<commit_message>
case 1 report to general manager
</commit_message>
<xml_diff>
--- a/Mammy-Yummy!.pptx
+++ b/Mammy-Yummy!.pptx
@@ -11687,13 +11687,13 @@
         </p:nvSpPr>
         <p:spPr>
           <a:xfrm>
-            <a:off x="838200" y="1825625"/>
-            <a:ext cx="10515600" cy="3289300"/>
+            <a:off x="838200" y="1825624"/>
+            <a:ext cx="10515600" cy="4098657"/>
           </a:xfrm>
         </p:spPr>
         <p:txBody>
           <a:bodyPr>
-            <a:normAutofit/>
+            <a:normAutofit lnSpcReduction="10000"/>
           </a:bodyPr>
           <a:lstStyle/>
           <a:p>
@@ -11725,6 +11725,15 @@
               <a:rPr lang="en-US" dirty="0"/>
               <a:t>The marketing manager reports to the supply chain manager.</a:t>
             </a:r>
+          </a:p>
+          <a:p>
+            <a:r>
+              <a:rPr lang="en-US" dirty="0"/>
+              <a:t>Supply chain manager reports to the general Manager and CC to the legal counsel. </a:t>
+            </a:r>
+          </a:p>
+          <a:p>
+            <a:endParaRPr lang="en-US" dirty="0"/>
           </a:p>
           <a:p>
             <a:endParaRPr lang="en-US" dirty="0"/>

</xml_diff>